<commit_message>
minor update to pptx
</commit_message>
<xml_diff>
--- a/2017.04.11-templates-channel9.pptx
+++ b/2017.04.11-templates-channel9.pptx
@@ -113,6 +113,11 @@
       </a:defRPr>
     </a:lvl9pPr>
   </p:defaultTextStyle>
+  <p:extLst>
+    <p:ext uri="{EFAFB233-063F-42B5-8137-9DF3F51BA10A}">
+      <p15:sldGuideLst xmlns:p15="http://schemas.microsoft.com/office/powerpoint/2012/main"/>
+    </p:ext>
+  </p:extLst>
 </p:presentation>
 </file>
 
@@ -3343,25 +3348,6 @@
               <a:t>OSS Templates for .NET</a:t>
             </a:r>
             <a:endParaRPr lang="en-US" dirty="0"/>
-          </a:p>
-        </p:txBody>
-      </p:sp>
-      <p:sp>
-        <p:nvSpPr>
-          <p:cNvPr id="3" name="Subtitle 2"/>
-          <p:cNvSpPr>
-            <a:spLocks noGrp="1"/>
-          </p:cNvSpPr>
-          <p:nvPr>
-            <p:ph type="subTitle" idx="1"/>
-          </p:nvPr>
-        </p:nvSpPr>
-        <p:spPr/>
-        <p:txBody>
-          <a:bodyPr/>
-          <a:lstStyle/>
-          <a:p>
-            <a:endParaRPr lang="en-US"/>
           </a:p>
         </p:txBody>
       </p:sp>
@@ -4980,7 +4966,7 @@
         <p:spPr/>
         <p:txBody>
           <a:bodyPr>
-            <a:normAutofit lnSpcReduction="10000"/>
+            <a:normAutofit fontScale="92500" lnSpcReduction="10000"/>
           </a:bodyPr>
           <a:lstStyle/>
           <a:p>
@@ -5105,30 +5091,41 @@
               <a:t>Samples from today - </a:t>
             </a:r>
             <a:r>
-              <a:rPr lang="en-US" dirty="0" err="1" smtClean="0">
-                <a:hlinkClick r:id="rId8"/>
-              </a:rPr>
-              <a:t>github.com</a:t>
-            </a:r>
-            <a:r>
               <a:rPr lang="en-US" dirty="0" smtClean="0">
                 <a:hlinkClick r:id="rId8"/>
               </a:rPr>
-              <a:t>/</a:t>
+              <a:t>github.com/sayedihashimi/channel9-templates-2017.04.11</a:t>
+            </a:r>
+            <a:endParaRPr lang="en-US" dirty="0" smtClean="0"/>
+          </a:p>
+          <a:p>
+            <a:r>
+              <a:rPr lang="en-US" dirty="0" smtClean="0"/>
+              <a:t>Twitter - </a:t>
+            </a:r>
+            <a:r>
+              <a:rPr lang="en-US" dirty="0" smtClean="0">
+                <a:latin typeface="Consolas" charset="0"/>
+                <a:ea typeface="Consolas" charset="0"/>
+                <a:cs typeface="Consolas" charset="0"/>
+                <a:hlinkClick r:id="rId9"/>
+              </a:rPr>
+              <a:t>@</a:t>
             </a:r>
             <a:r>
               <a:rPr lang="en-US" dirty="0" err="1" smtClean="0">
-                <a:hlinkClick r:id="rId8"/>
+                <a:latin typeface="Consolas" charset="0"/>
+                <a:ea typeface="Consolas" charset="0"/>
+                <a:cs typeface="Consolas" charset="0"/>
+                <a:hlinkClick r:id="rId9"/>
               </a:rPr>
-              <a:t>sayedihashimi</a:t>
-            </a:r>
-            <a:r>
-              <a:rPr lang="en-US" dirty="0" smtClean="0">
-                <a:hlinkClick r:id="rId8"/>
-              </a:rPr>
-              <a:t>/channel9-templates-2017.04.11</a:t>
-            </a:r>
-            <a:endParaRPr lang="en-US" dirty="0" smtClean="0"/>
+              <a:t>SayedIHashimi</a:t>
+            </a:r>
+            <a:endParaRPr lang="en-US" dirty="0" smtClean="0">
+              <a:latin typeface="Consolas" charset="0"/>
+              <a:ea typeface="Consolas" charset="0"/>
+              <a:cs typeface="Consolas" charset="0"/>
+            </a:endParaRPr>
           </a:p>
         </p:txBody>
       </p:sp>

</xml_diff>